<commit_message>
docs: edit .zip download instructions
</commit_message>
<xml_diff>
--- a/slides/effective-displays-2021-06-26.pptx
+++ b/slides/effective-displays-2021-06-26.pptx
@@ -268,7 +268,7 @@
 <file path=ppt/revisionInfo.xml><?xml version="1.0" encoding="utf-8"?>
 <p1510:revInfo xmlns:a="http://schemas.openxmlformats.org/drawingml/2006/main" xmlns:r="http://schemas.openxmlformats.org/officeDocument/2006/relationships" xmlns:p1510="http://schemas.microsoft.com/office/powerpoint/2015/10/main">
   <p1510:revLst>
-    <p1510:client id="{38A51833-585D-4C73-BC6C-E0ECD46DD4D4}" v="82" dt="2021-06-26T20:17:26.711"/>
+    <p1510:client id="{17E79370-D5F9-431E-A711-EDD04E0C1F3C}" v="2" dt="2021-07-18T15:20:07.464"/>
   </p1510:revLst>
 </p1510:revInfo>
 </file>
@@ -355,7 +355,7 @@
           <a:p>
             <a:fld id="{9A223849-021F-452E-A1F3-892AE52BBE56}" type="datetimeFigureOut">
               <a:rPr lang="en-US" smtClean="0"/>
-              <a:t>6/26/2021</a:t>
+              <a:t>7/18/2021</a:t>
             </a:fld>
             <a:endParaRPr lang="en-US"/>
           </a:p>

</xml_diff>